<commit_message>
Cleanup vehicule.py Save dataset, screen copies
</commit_message>
<xml_diff>
--- a/Présenations/Apprentissage neuronal.pptx
+++ b/Présenations/Apprentissage neuronal.pptx
@@ -264,7 +264,7 @@
           <a:p>
             <a:fld id="{3F95B598-50DE-4D74-A578-EB607A23EE85}" type="datetimeFigureOut">
               <a:rPr lang="fr-FR" smtClean="0"/>
-              <a:t>06/03/2023</a:t>
+              <a:t>07/03/2023</a:t>
             </a:fld>
             <a:endParaRPr lang="fr-FR"/>
           </a:p>
@@ -434,7 +434,7 @@
           <a:p>
             <a:fld id="{3F95B598-50DE-4D74-A578-EB607A23EE85}" type="datetimeFigureOut">
               <a:rPr lang="fr-FR" smtClean="0"/>
-              <a:t>06/03/2023</a:t>
+              <a:t>07/03/2023</a:t>
             </a:fld>
             <a:endParaRPr lang="fr-FR"/>
           </a:p>
@@ -614,7 +614,7 @@
           <a:p>
             <a:fld id="{3F95B598-50DE-4D74-A578-EB607A23EE85}" type="datetimeFigureOut">
               <a:rPr lang="fr-FR" smtClean="0"/>
-              <a:t>06/03/2023</a:t>
+              <a:t>07/03/2023</a:t>
             </a:fld>
             <a:endParaRPr lang="fr-FR"/>
           </a:p>
@@ -784,7 +784,7 @@
           <a:p>
             <a:fld id="{3F95B598-50DE-4D74-A578-EB607A23EE85}" type="datetimeFigureOut">
               <a:rPr lang="fr-FR" smtClean="0"/>
-              <a:t>06/03/2023</a:t>
+              <a:t>07/03/2023</a:t>
             </a:fld>
             <a:endParaRPr lang="fr-FR"/>
           </a:p>
@@ -1030,7 +1030,7 @@
           <a:p>
             <a:fld id="{3F95B598-50DE-4D74-A578-EB607A23EE85}" type="datetimeFigureOut">
               <a:rPr lang="fr-FR" smtClean="0"/>
-              <a:t>06/03/2023</a:t>
+              <a:t>07/03/2023</a:t>
             </a:fld>
             <a:endParaRPr lang="fr-FR"/>
           </a:p>
@@ -1262,7 +1262,7 @@
           <a:p>
             <a:fld id="{3F95B598-50DE-4D74-A578-EB607A23EE85}" type="datetimeFigureOut">
               <a:rPr lang="fr-FR" smtClean="0"/>
-              <a:t>06/03/2023</a:t>
+              <a:t>07/03/2023</a:t>
             </a:fld>
             <a:endParaRPr lang="fr-FR"/>
           </a:p>
@@ -1629,7 +1629,7 @@
           <a:p>
             <a:fld id="{3F95B598-50DE-4D74-A578-EB607A23EE85}" type="datetimeFigureOut">
               <a:rPr lang="fr-FR" smtClean="0"/>
-              <a:t>06/03/2023</a:t>
+              <a:t>07/03/2023</a:t>
             </a:fld>
             <a:endParaRPr lang="fr-FR"/>
           </a:p>
@@ -1747,7 +1747,7 @@
           <a:p>
             <a:fld id="{3F95B598-50DE-4D74-A578-EB607A23EE85}" type="datetimeFigureOut">
               <a:rPr lang="fr-FR" smtClean="0"/>
-              <a:t>06/03/2023</a:t>
+              <a:t>07/03/2023</a:t>
             </a:fld>
             <a:endParaRPr lang="fr-FR"/>
           </a:p>
@@ -1842,7 +1842,7 @@
           <a:p>
             <a:fld id="{3F95B598-50DE-4D74-A578-EB607A23EE85}" type="datetimeFigureOut">
               <a:rPr lang="fr-FR" smtClean="0"/>
-              <a:t>06/03/2023</a:t>
+              <a:t>07/03/2023</a:t>
             </a:fld>
             <a:endParaRPr lang="fr-FR"/>
           </a:p>
@@ -2119,7 +2119,7 @@
           <a:p>
             <a:fld id="{3F95B598-50DE-4D74-A578-EB607A23EE85}" type="datetimeFigureOut">
               <a:rPr lang="fr-FR" smtClean="0"/>
-              <a:t>06/03/2023</a:t>
+              <a:t>07/03/2023</a:t>
             </a:fld>
             <a:endParaRPr lang="fr-FR"/>
           </a:p>
@@ -2372,7 +2372,7 @@
           <a:p>
             <a:fld id="{3F95B598-50DE-4D74-A578-EB607A23EE85}" type="datetimeFigureOut">
               <a:rPr lang="fr-FR" smtClean="0"/>
-              <a:t>06/03/2023</a:t>
+              <a:t>07/03/2023</a:t>
             </a:fld>
             <a:endParaRPr lang="fr-FR"/>
           </a:p>
@@ -2585,7 +2585,7 @@
           <a:p>
             <a:fld id="{3F95B598-50DE-4D74-A578-EB607A23EE85}" type="datetimeFigureOut">
               <a:rPr lang="fr-FR" smtClean="0"/>
-              <a:t>06/03/2023</a:t>
+              <a:t>07/03/2023</a:t>
             </a:fld>
             <a:endParaRPr lang="fr-FR"/>
           </a:p>
@@ -3019,15 +3019,7 @@
                   <a:srgbClr val="0070C0"/>
                 </a:solidFill>
               </a:rPr>
-              <a:t>Utilisation d’un réseau de </a:t>
-            </a:r>
-            <a:r>
-              <a:rPr lang="fr-FR" dirty="0" smtClean="0">
-                <a:solidFill>
-                  <a:srgbClr val="0070C0"/>
-                </a:solidFill>
-              </a:rPr>
-              <a:t>neurones entrainé</a:t>
+              <a:t>Utilisation d’un réseau de neurones entrainé</a:t>
             </a:r>
             <a:br>
               <a:rPr lang="fr-FR" dirty="0" smtClean="0">
@@ -3208,161 +3200,108 @@
                   </a:schemeClr>
                 </a:solidFill>
               </a:rPr>
-              <a:t>On </a:t>
-            </a:r>
-            <a:r>
-              <a:rPr lang="fr-FR" dirty="0" smtClean="0">
+              <a:t>On veut entraîner un réseau de neurones (</a:t>
+            </a:r>
+            <a:r>
+              <a:rPr lang="fr-FR" dirty="0" err="1" smtClean="0">
                 <a:solidFill>
                   <a:schemeClr val="accent6">
                     <a:lumMod val="75000"/>
                   </a:schemeClr>
                 </a:solidFill>
               </a:rPr>
-              <a:t>veut entraîner un réseau de neurones (</a:t>
-            </a:r>
-            <a:r>
-              <a:rPr lang="fr-FR" dirty="0" err="1" smtClean="0">
+              <a:t>RdN</a:t>
+            </a:r>
+            <a:r>
+              <a:rPr lang="fr-FR" dirty="0" smtClean="0">
                 <a:solidFill>
                   <a:schemeClr val="accent6">
                     <a:lumMod val="75000"/>
                   </a:schemeClr>
                 </a:solidFill>
               </a:rPr>
+              <a:t>) sur un ensemble de figures</a:t>
+            </a:r>
+          </a:p>
+          <a:p>
+            <a:pPr lvl="1"/>
+            <a:r>
+              <a:rPr lang="fr-FR" dirty="0" smtClean="0">
+                <a:solidFill>
+                  <a:srgbClr val="C00000"/>
+                </a:solidFill>
+              </a:rPr>
+              <a:t>Chaque figure sera dessinée (</a:t>
+            </a:r>
+            <a:r>
+              <a:rPr lang="fr-FR" i="1" dirty="0" smtClean="0">
+                <a:solidFill>
+                  <a:srgbClr val="C00000"/>
+                </a:solidFill>
+              </a:rPr>
+              <a:t>imprimée</a:t>
+            </a:r>
+            <a:r>
+              <a:rPr lang="fr-FR" dirty="0" smtClean="0">
+                <a:solidFill>
+                  <a:srgbClr val="C00000"/>
+                </a:solidFill>
+              </a:rPr>
+              <a:t>) sur un jeton (</a:t>
+            </a:r>
+            <a:r>
+              <a:rPr lang="fr-FR" i="1" dirty="0" smtClean="0">
+                <a:solidFill>
+                  <a:srgbClr val="C00000"/>
+                </a:solidFill>
+              </a:rPr>
+              <a:t>papier</a:t>
+            </a:r>
+            <a:r>
+              <a:rPr lang="fr-FR" dirty="0" smtClean="0">
+                <a:solidFill>
+                  <a:srgbClr val="C00000"/>
+                </a:solidFill>
+              </a:rPr>
+              <a:t>)</a:t>
+            </a:r>
+          </a:p>
+          <a:p>
+            <a:pPr lvl="1"/>
+            <a:r>
+              <a:rPr lang="fr-FR" dirty="0" smtClean="0">
+                <a:solidFill>
+                  <a:srgbClr val="C00000"/>
+                </a:solidFill>
+              </a:rPr>
+              <a:t>Un jeu, matérialisé par un véhicule-robot, est doté d’une caméra</a:t>
+            </a:r>
+          </a:p>
+          <a:p>
+            <a:pPr lvl="1"/>
+            <a:r>
+              <a:rPr lang="fr-FR" dirty="0" smtClean="0">
+                <a:solidFill>
+                  <a:srgbClr val="C00000"/>
+                </a:solidFill>
+              </a:rPr>
+              <a:t>Une fois entraîné, le </a:t>
+            </a:r>
+            <a:r>
+              <a:rPr lang="fr-FR" dirty="0" err="1" smtClean="0">
+                <a:solidFill>
+                  <a:srgbClr val="C00000"/>
+                </a:solidFill>
+              </a:rPr>
               <a:t>RdN</a:t>
             </a:r>
             <a:r>
               <a:rPr lang="fr-FR" dirty="0" smtClean="0">
                 <a:solidFill>
-                  <a:schemeClr val="accent6">
-                    <a:lumMod val="75000"/>
-                  </a:schemeClr>
-                </a:solidFill>
-              </a:rPr>
-              <a:t>) sur un ensemble de </a:t>
-            </a:r>
-            <a:r>
-              <a:rPr lang="fr-FR" dirty="0" smtClean="0">
-                <a:solidFill>
-                  <a:schemeClr val="accent6">
-                    <a:lumMod val="75000"/>
-                  </a:schemeClr>
-                </a:solidFill>
-              </a:rPr>
-              <a:t>figures</a:t>
-            </a:r>
-            <a:endParaRPr lang="fr-FR" dirty="0" smtClean="0">
-              <a:solidFill>
-                <a:schemeClr val="accent6">
-                  <a:lumMod val="75000"/>
-                </a:schemeClr>
-              </a:solidFill>
-            </a:endParaRPr>
-          </a:p>
-          <a:p>
-            <a:pPr lvl="1"/>
-            <a:r>
-              <a:rPr lang="fr-FR" dirty="0" smtClean="0">
-                <a:solidFill>
                   <a:srgbClr val="C00000"/>
                 </a:solidFill>
               </a:rPr>
-              <a:t>Chaque figure sera dessinée (</a:t>
-            </a:r>
-            <a:r>
-              <a:rPr lang="fr-FR" i="1" dirty="0" smtClean="0">
-                <a:solidFill>
-                  <a:srgbClr val="C00000"/>
-                </a:solidFill>
-              </a:rPr>
-              <a:t>imprimée</a:t>
-            </a:r>
-            <a:r>
-              <a:rPr lang="fr-FR" dirty="0" smtClean="0">
-                <a:solidFill>
-                  <a:srgbClr val="C00000"/>
-                </a:solidFill>
-              </a:rPr>
-              <a:t>) sur un jeton (</a:t>
-            </a:r>
-            <a:r>
-              <a:rPr lang="fr-FR" i="1" dirty="0" smtClean="0">
-                <a:solidFill>
-                  <a:srgbClr val="C00000"/>
-                </a:solidFill>
-              </a:rPr>
-              <a:t>papier</a:t>
-            </a:r>
-            <a:r>
-              <a:rPr lang="fr-FR" dirty="0" smtClean="0">
-                <a:solidFill>
-                  <a:srgbClr val="C00000"/>
-                </a:solidFill>
-              </a:rPr>
-              <a:t>)</a:t>
-            </a:r>
-            <a:endParaRPr lang="fr-FR" dirty="0" smtClean="0">
-              <a:solidFill>
-                <a:srgbClr val="C00000"/>
-              </a:solidFill>
-            </a:endParaRPr>
-          </a:p>
-          <a:p>
-            <a:pPr lvl="1"/>
-            <a:r>
-              <a:rPr lang="fr-FR" dirty="0" smtClean="0">
-                <a:solidFill>
-                  <a:srgbClr val="C00000"/>
-                </a:solidFill>
-              </a:rPr>
-              <a:t>Un jeu, matérialisé par un véhicule-robot, est doté </a:t>
-            </a:r>
-            <a:r>
-              <a:rPr lang="fr-FR" dirty="0" smtClean="0">
-                <a:solidFill>
-                  <a:srgbClr val="C00000"/>
-                </a:solidFill>
-              </a:rPr>
-              <a:t>d’une caméra</a:t>
-            </a:r>
-            <a:endParaRPr lang="fr-FR" dirty="0" smtClean="0">
-              <a:solidFill>
-                <a:srgbClr val="C00000"/>
-              </a:solidFill>
-            </a:endParaRPr>
-          </a:p>
-          <a:p>
-            <a:pPr lvl="1"/>
-            <a:r>
-              <a:rPr lang="fr-FR" dirty="0" smtClean="0">
-                <a:solidFill>
-                  <a:srgbClr val="C00000"/>
-                </a:solidFill>
-              </a:rPr>
-              <a:t>Une fois entraîné, le </a:t>
-            </a:r>
-            <a:r>
-              <a:rPr lang="fr-FR" dirty="0" err="1" smtClean="0">
-                <a:solidFill>
-                  <a:srgbClr val="C00000"/>
-                </a:solidFill>
-              </a:rPr>
-              <a:t>RdN</a:t>
-            </a:r>
-            <a:r>
-              <a:rPr lang="fr-FR" dirty="0" smtClean="0">
-                <a:solidFill>
-                  <a:srgbClr val="C00000"/>
-                </a:solidFill>
-              </a:rPr>
-              <a:t> sera interrogé </a:t>
-            </a:r>
-            <a:r>
-              <a:rPr lang="fr-FR" dirty="0" smtClean="0">
-                <a:solidFill>
-                  <a:srgbClr val="C00000"/>
-                </a:solidFill>
-              </a:rPr>
-              <a:t>lorsque la caméra détecte un des jetons, pour obtenir le Numéro de la figure qui est imprimée.</a:t>
+              <a:t> sera interrogé lorsque la caméra détecte un des jetons, pour obtenir le Numéro de la figure qui est imprimée.</a:t>
             </a:r>
           </a:p>
           <a:p>
@@ -8013,15 +7952,7 @@
                       <a:schemeClr val="tx1"/>
                     </a:solidFill>
                   </a:rPr>
-                  <a:t>N° </a:t>
-                </a:r>
-                <a:r>
-                  <a:rPr lang="fr-FR" dirty="0" smtClean="0">
-                    <a:solidFill>
-                      <a:schemeClr val="tx1"/>
-                    </a:solidFill>
-                  </a:rPr>
-                  <a:t>figure</a:t>
+                  <a:t>N° figure</a:t>
                 </a:r>
                 <a:endParaRPr lang="fr-FR" dirty="0">
                   <a:solidFill>
@@ -8494,13 +8425,8 @@
           <a:p>
             <a:r>
               <a:rPr lang="fr-FR" dirty="0" smtClean="0"/>
-              <a:t>La </a:t>
-            </a:r>
-            <a:r>
-              <a:rPr lang="fr-FR" dirty="0" smtClean="0"/>
-              <a:t>structure générale est identique à notre premier exemple: 1 couche d’entrée, 1 couche de sortie, et plusieurs couches profondes</a:t>
-            </a:r>
-            <a:endParaRPr lang="fr-FR" dirty="0" smtClean="0"/>
+              <a:t>La structure générale est identique à notre premier exemple: 1 couche d’entrée, 1 couche de sortie, et plusieurs couches profondes</a:t>
+            </a:r>
           </a:p>
           <a:p>
             <a:pPr lvl="1"/>
@@ -8528,11 +8454,6 @@
               </a:rPr>
               <a:t> des images = 40 x 40 x 3 (RGB)</a:t>
             </a:r>
-            <a:endParaRPr lang="fr-FR" dirty="0" smtClean="0">
-              <a:solidFill>
-                <a:srgbClr val="C00000"/>
-              </a:solidFill>
-            </a:endParaRPr>
           </a:p>
           <a:p>
             <a:pPr lvl="1"/>
@@ -8542,61 +8463,8 @@
                   <a:srgbClr val="C00000"/>
                 </a:solidFill>
               </a:rPr>
-              <a:t>Pour la couche de sortie, Ici, </a:t>
-            </a:r>
-            <a:r>
-              <a:rPr lang="fr-FR" dirty="0" smtClean="0">
-                <a:solidFill>
-                  <a:srgbClr val="C00000"/>
-                </a:solidFill>
-              </a:rPr>
-              <a:t>la sortie </a:t>
-            </a:r>
-            <a:r>
-              <a:rPr lang="fr-FR" dirty="0" smtClean="0">
-                <a:solidFill>
-                  <a:srgbClr val="C00000"/>
-                </a:solidFill>
-              </a:rPr>
-              <a:t>correspond au numéro de la figure à reconnaître c’est-à-dire </a:t>
-            </a:r>
-            <a:r>
-              <a:rPr lang="fr-FR" dirty="0" smtClean="0">
-                <a:solidFill>
-                  <a:srgbClr val="C00000"/>
-                </a:solidFill>
-              </a:rPr>
-              <a:t>un nombre entier ([0 .. </a:t>
-            </a:r>
-            <a:r>
-              <a:rPr lang="fr-FR" dirty="0" smtClean="0">
-                <a:solidFill>
-                  <a:srgbClr val="C00000"/>
-                </a:solidFill>
-              </a:rPr>
-              <a:t>7]) </a:t>
-            </a:r>
-            <a:r>
-              <a:rPr lang="fr-FR" dirty="0" smtClean="0">
-                <a:solidFill>
-                  <a:srgbClr val="C00000"/>
-                </a:solidFill>
-              </a:rPr>
-              <a:t>donc il suffit d’un seul </a:t>
-            </a:r>
-            <a:r>
-              <a:rPr lang="fr-FR" dirty="0" smtClean="0">
-                <a:solidFill>
-                  <a:srgbClr val="C00000"/>
-                </a:solidFill>
-              </a:rPr>
-              <a:t>neurone!</a:t>
-            </a:r>
-            <a:endParaRPr lang="fr-FR" dirty="0" smtClean="0">
-              <a:solidFill>
-                <a:srgbClr val="C00000"/>
-              </a:solidFill>
-            </a:endParaRPr>
+              <a:t>Pour la couche de sortie, Ici, la sortie correspond au numéro de la figure à reconnaître c’est-à-dire un nombre entier ([0 .. 7]) donc il suffit d’un seul neurone!</a:t>
+            </a:r>
           </a:p>
           <a:p>
             <a:pPr lvl="1"/>
@@ -9081,40 +8949,9 @@
           <a:chExt cx="0" cy="0"/>
         </a:xfrm>
       </p:grpSpPr>
-      <p:sp>
-        <p:nvSpPr>
-          <p:cNvPr id="2" name="Titre 1"/>
-          <p:cNvSpPr>
-            <a:spLocks noGrp="1"/>
-          </p:cNvSpPr>
-          <p:nvPr>
-            <p:ph type="title"/>
-          </p:nvPr>
-        </p:nvSpPr>
-        <p:spPr/>
-        <p:txBody>
-          <a:bodyPr/>
-          <a:lstStyle/>
-          <a:p>
-            <a:r>
-              <a:rPr lang="fr-FR" dirty="0" smtClean="0">
-                <a:solidFill>
-                  <a:srgbClr val="0070C0"/>
-                </a:solidFill>
-              </a:rPr>
-              <a:t>Outil de simulation</a:t>
-            </a:r>
-            <a:endParaRPr lang="fr-FR" dirty="0">
-              <a:solidFill>
-                <a:srgbClr val="0070C0"/>
-              </a:solidFill>
-            </a:endParaRPr>
-          </a:p>
-        </p:txBody>
-      </p:sp>
       <p:pic>
         <p:nvPicPr>
-          <p:cNvPr id="4" name="Image 3"/>
+          <p:cNvPr id="7" name="Image 6"/>
           <p:cNvPicPr>
             <a:picLocks noChangeAspect="1"/>
           </p:cNvPicPr>
@@ -9134,17 +8971,48 @@
         </p:blipFill>
         <p:spPr>
           <a:xfrm>
-            <a:off x="517344" y="1551350"/>
-            <a:ext cx="5894362" cy="4644934"/>
+            <a:off x="9578715" y="4122983"/>
+            <a:ext cx="1362075" cy="1647825"/>
           </a:xfrm>
           <a:prstGeom prst="rect">
             <a:avLst/>
           </a:prstGeom>
         </p:spPr>
       </p:pic>
+      <p:sp>
+        <p:nvSpPr>
+          <p:cNvPr id="2" name="Titre 1"/>
+          <p:cNvSpPr>
+            <a:spLocks noGrp="1"/>
+          </p:cNvSpPr>
+          <p:nvPr>
+            <p:ph type="title"/>
+          </p:nvPr>
+        </p:nvSpPr>
+        <p:spPr/>
+        <p:txBody>
+          <a:bodyPr/>
+          <a:lstStyle/>
+          <a:p>
+            <a:r>
+              <a:rPr lang="fr-FR" dirty="0" smtClean="0">
+                <a:solidFill>
+                  <a:srgbClr val="0070C0"/>
+                </a:solidFill>
+              </a:rPr>
+              <a:t>Outil de simulation</a:t>
+            </a:r>
+            <a:endParaRPr lang="fr-FR" dirty="0">
+              <a:solidFill>
+                <a:srgbClr val="0070C0"/>
+              </a:solidFill>
+            </a:endParaRPr>
+          </a:p>
+        </p:txBody>
+      </p:sp>
       <p:pic>
         <p:nvPicPr>
-          <p:cNvPr id="5" name="Image 4"/>
+          <p:cNvPr id="3" name="Image 2"/>
           <p:cNvPicPr>
             <a:picLocks noChangeAspect="1"/>
           </p:cNvPicPr>
@@ -9164,8 +9032,8 @@
         </p:blipFill>
         <p:spPr>
           <a:xfrm>
-            <a:off x="9689111" y="4294550"/>
-            <a:ext cx="1362075" cy="1647825"/>
+            <a:off x="380812" y="1491888"/>
+            <a:ext cx="6336405" cy="4993277"/>
           </a:xfrm>
           <a:prstGeom prst="rect">
             <a:avLst/>
@@ -9215,8 +9083,8 @@
           </a:xfrm>
           <a:prstGeom prst="wedgeRoundRectCallout">
             <a:avLst>
-              <a:gd name="adj1" fmla="val -84249"/>
-              <a:gd name="adj2" fmla="val 380929"/>
+              <a:gd name="adj1" fmla="val -138030"/>
+              <a:gd name="adj2" fmla="val 338348"/>
               <a:gd name="adj3" fmla="val 16667"/>
             </a:avLst>
           </a:prstGeom>
@@ -9269,13 +9137,13 @@
         </p:nvSpPr>
         <p:spPr>
           <a:xfrm>
-            <a:off x="5895702" y="2363682"/>
+            <a:off x="6130835" y="2363682"/>
             <a:ext cx="2438589" cy="844934"/>
           </a:xfrm>
           <a:prstGeom prst="wedgeRoundRectCallout">
             <a:avLst>
-              <a:gd name="adj1" fmla="val -162457"/>
-              <a:gd name="adj2" fmla="val 130473"/>
+              <a:gd name="adj1" fmla="val -202811"/>
+              <a:gd name="adj2" fmla="val 140780"/>
               <a:gd name="adj3" fmla="val 16667"/>
             </a:avLst>
           </a:prstGeom>
@@ -9344,8 +9212,8 @@
           </a:xfrm>
           <a:prstGeom prst="wedgeRoundRectCallout">
             <a:avLst>
-              <a:gd name="adj1" fmla="val -272900"/>
-              <a:gd name="adj2" fmla="val 111530"/>
+              <a:gd name="adj1" fmla="val -258059"/>
+              <a:gd name="adj2" fmla="val 322916"/>
               <a:gd name="adj3" fmla="val 16667"/>
             </a:avLst>
           </a:prstGeom>
@@ -15861,17 +15729,7 @@
                   </a:schemeClr>
                 </a:solidFill>
               </a:rPr>
-              <a:t>On </a:t>
-            </a:r>
-            <a:r>
-              <a:rPr lang="fr-FR" dirty="0" smtClean="0">
-                <a:solidFill>
-                  <a:schemeClr val="accent6">
-                    <a:lumMod val="75000"/>
-                  </a:schemeClr>
-                </a:solidFill>
-              </a:rPr>
-              <a:t>veut entraîner un réseau de neurones (</a:t>
+              <a:t>On veut entraîner un réseau de neurones (</a:t>
             </a:r>
             <a:r>
               <a:rPr lang="fr-FR" dirty="0" err="1" smtClean="0">
@@ -24287,21 +24145,8 @@
                   <a:srgbClr val="C00000"/>
                 </a:solidFill>
               </a:rPr>
-              <a:t>Une fonction de </a:t>
-            </a:r>
-            <a:r>
-              <a:rPr lang="fr-FR" dirty="0" smtClean="0">
-                <a:solidFill>
-                  <a:srgbClr val="C00000"/>
-                </a:solidFill>
-              </a:rPr>
-              <a:t>transfert non linéaire</a:t>
-            </a:r>
-            <a:endParaRPr lang="fr-FR" dirty="0" smtClean="0">
-              <a:solidFill>
-                <a:srgbClr val="C00000"/>
-              </a:solidFill>
-            </a:endParaRPr>
+              <a:t>Une fonction de transfert non linéaire</a:t>
+            </a:r>
           </a:p>
           <a:p>
             <a:pPr lvl="2"/>
@@ -27447,8 +27292,8 @@
           </p:style>
         </p:cxnSp>
       </p:grpSp>
-      <mc:AlternateContent xmlns:mc="http://schemas.openxmlformats.org/markup-compatibility/2006">
-        <mc:Choice xmlns:a14="http://schemas.microsoft.com/office/drawing/2010/main" Requires="a14">
+      <mc:AlternateContent xmlns:mc="http://schemas.openxmlformats.org/markup-compatibility/2006" xmlns:a14="http://schemas.microsoft.com/office/drawing/2010/main">
+        <mc:Choice Requires="a14">
           <p:sp>
             <p:nvSpPr>
               <p:cNvPr id="69" name="ZoneTexte 68"/>
@@ -27634,7 +27479,7 @@
             </p:txBody>
           </p:sp>
         </mc:Choice>
-        <mc:Fallback>
+        <mc:Fallback xmlns="">
           <p:sp>
             <p:nvSpPr>
               <p:cNvPr id="69" name="ZoneTexte 68"/>
@@ -28427,7 +28272,6 @@
               <a:rPr lang="fr-FR" dirty="0" smtClean="0"/>
               <a:t>La dimension des couches profondes est uniquement déterminée par l’expérience (!!!) et la capacité en mémoire ou CPU </a:t>
             </a:r>
-            <a:endParaRPr lang="fr-FR" dirty="0" smtClean="0"/>
           </a:p>
           <a:p>
             <a:pPr lvl="1"/>
@@ -28541,23 +28385,7 @@
                   <a:srgbClr val="0070C0"/>
                 </a:solidFill>
               </a:rPr>
-              <a:t>Quelles sont les </a:t>
-            </a:r>
-            <a:r>
-              <a:rPr lang="fr-FR" dirty="0" smtClean="0">
-                <a:solidFill>
-                  <a:srgbClr val="0070C0"/>
-                </a:solidFill>
-              </a:rPr>
-              <a:t>étapes de </a:t>
-            </a:r>
-            <a:r>
-              <a:rPr lang="fr-FR" dirty="0" smtClean="0">
-                <a:solidFill>
-                  <a:srgbClr val="0070C0"/>
-                </a:solidFill>
-              </a:rPr>
-              <a:t>l’apprentissage?</a:t>
+              <a:t>Quelles sont les étapes de l’apprentissage?</a:t>
             </a:r>
             <a:endParaRPr lang="fr-FR" dirty="0">
               <a:solidFill>
@@ -28614,21 +28442,8 @@
                   <a:srgbClr val="C00000"/>
                 </a:solidFill>
               </a:rPr>
-              <a:t>Le jeu de couleurs choisi, est caractéristique de l’apprentissage. Si on change ces valeurs, l’apprentissage sera à </a:t>
-            </a:r>
-            <a:r>
-              <a:rPr lang="fr-FR" dirty="0" smtClean="0">
-                <a:solidFill>
-                  <a:srgbClr val="C00000"/>
-                </a:solidFill>
-              </a:rPr>
-              <a:t>refaire !!!</a:t>
-            </a:r>
-            <a:endParaRPr lang="fr-FR" dirty="0" smtClean="0">
-              <a:solidFill>
-                <a:srgbClr val="C00000"/>
-              </a:solidFill>
-            </a:endParaRPr>
+              <a:t>Le jeu de couleurs choisi, est caractéristique de l’apprentissage. Si on change ces valeurs, l’apprentissage sera à refaire !!!</a:t>
+            </a:r>
           </a:p>
           <a:p>
             <a:pPr marL="514350" indent="-514350">
@@ -28737,11 +28552,7 @@
             </a:r>
             <a:r>
               <a:rPr lang="fr-FR" dirty="0" smtClean="0"/>
-              <a:t> jeux </a:t>
-            </a:r>
-            <a:r>
-              <a:rPr lang="fr-FR" dirty="0" smtClean="0"/>
-              <a:t>de données (</a:t>
+              <a:t> jeux de données (</a:t>
             </a:r>
             <a:r>
               <a:rPr lang="fr-FR" i="1" dirty="0" smtClean="0"/>
@@ -28751,7 +28562,6 @@
               <a:rPr lang="fr-FR" dirty="0" smtClean="0"/>
               <a:t>) et reflétant la distribution statistique des données à reconnaître ensuite:</a:t>
             </a:r>
-            <a:endParaRPr lang="fr-FR" dirty="0" smtClean="0"/>
           </a:p>
           <a:p>
             <a:pPr lvl="1"/>
@@ -30800,11 +30610,6 @@
               </a:rPr>
               <a:t>Manipulation et traitement d’images</a:t>
             </a:r>
-            <a:endParaRPr lang="fr-FR" dirty="0" smtClean="0">
-              <a:solidFill>
-                <a:srgbClr val="C00000"/>
-              </a:solidFill>
-            </a:endParaRPr>
           </a:p>
           <a:p>
             <a:r>
@@ -31111,17 +30916,22 @@
               <a:rPr lang="fr-FR" dirty="0" smtClean="0">
                 <a:latin typeface="Comic Sans MS" panose="030F0702030302020204" pitchFamily="66" charset="0"/>
               </a:rPr>
-              <a:t> = 0 0 255           </a:t>
+              <a:t> = 0 0 255           (rouge)</a:t>
+            </a:r>
+          </a:p>
+          <a:p>
+            <a:r>
+              <a:rPr lang="fr-FR" dirty="0" err="1" smtClean="0">
+                <a:latin typeface="Comic Sans MS" panose="030F0702030302020204" pitchFamily="66" charset="0"/>
+              </a:rPr>
+              <a:t>Rgb</a:t>
             </a:r>
             <a:r>
               <a:rPr lang="fr-FR" dirty="0" smtClean="0">
                 <a:latin typeface="Comic Sans MS" panose="030F0702030302020204" pitchFamily="66" charset="0"/>
               </a:rPr>
-              <a:t>(rouge)</a:t>
-            </a:r>
-            <a:endParaRPr lang="fr-FR" dirty="0" smtClean="0">
-              <a:latin typeface="Comic Sans MS" panose="030F0702030302020204" pitchFamily="66" charset="0"/>
-            </a:endParaRPr>
+              <a:t> = 0 255 0           (vert)</a:t>
+            </a:r>
           </a:p>
           <a:p>
             <a:r>
@@ -31134,7 +30944,7 @@
               <a:rPr lang="fr-FR" dirty="0" smtClean="0">
                 <a:latin typeface="Comic Sans MS" panose="030F0702030302020204" pitchFamily="66" charset="0"/>
               </a:rPr>
-              <a:t> = 0 255 0           (vert)</a:t>
+              <a:t> = 0 255 255       (cyan)</a:t>
             </a:r>
           </a:p>
           <a:p>
@@ -31148,7 +30958,7 @@
               <a:rPr lang="fr-FR" dirty="0" smtClean="0">
                 <a:latin typeface="Comic Sans MS" panose="030F0702030302020204" pitchFamily="66" charset="0"/>
               </a:rPr>
-              <a:t> = 0 255 255       (cyan)</a:t>
+              <a:t> = 255 0 0           (jaune)</a:t>
             </a:r>
           </a:p>
           <a:p>
@@ -31162,54 +30972,22 @@
               <a:rPr lang="fr-FR" dirty="0" smtClean="0">
                 <a:latin typeface="Comic Sans MS" panose="030F0702030302020204" pitchFamily="66" charset="0"/>
               </a:rPr>
-              <a:t> = 255 0 0           </a:t>
+              <a:t> = 255 0 255       (magenta)</a:t>
+            </a:r>
+          </a:p>
+          <a:p>
+            <a:r>
+              <a:rPr lang="fr-FR" dirty="0" err="1" smtClean="0">
+                <a:latin typeface="Comic Sans MS" panose="030F0702030302020204" pitchFamily="66" charset="0"/>
+              </a:rPr>
+              <a:t>Rgb</a:t>
             </a:r>
             <a:r>
               <a:rPr lang="fr-FR" dirty="0" smtClean="0">
                 <a:latin typeface="Comic Sans MS" panose="030F0702030302020204" pitchFamily="66" charset="0"/>
               </a:rPr>
-              <a:t>(jaune)</a:t>
-            </a:r>
-            <a:endParaRPr lang="fr-FR" dirty="0" smtClean="0">
-              <a:latin typeface="Comic Sans MS" panose="030F0702030302020204" pitchFamily="66" charset="0"/>
-            </a:endParaRPr>
-          </a:p>
-          <a:p>
-            <a:r>
-              <a:rPr lang="fr-FR" dirty="0" err="1" smtClean="0">
-                <a:latin typeface="Comic Sans MS" panose="030F0702030302020204" pitchFamily="66" charset="0"/>
-              </a:rPr>
-              <a:t>Rgb</a:t>
-            </a:r>
-            <a:r>
-              <a:rPr lang="fr-FR" dirty="0" smtClean="0">
-                <a:latin typeface="Comic Sans MS" panose="030F0702030302020204" pitchFamily="66" charset="0"/>
-              </a:rPr>
-              <a:t> = 255 0 255       (magenta)</a:t>
-            </a:r>
-          </a:p>
-          <a:p>
-            <a:r>
-              <a:rPr lang="fr-FR" dirty="0" err="1" smtClean="0">
-                <a:latin typeface="Comic Sans MS" panose="030F0702030302020204" pitchFamily="66" charset="0"/>
-              </a:rPr>
-              <a:t>Rgb</a:t>
-            </a:r>
-            <a:r>
-              <a:rPr lang="fr-FR" dirty="0" smtClean="0">
-                <a:latin typeface="Comic Sans MS" panose="030F0702030302020204" pitchFamily="66" charset="0"/>
-              </a:rPr>
-              <a:t> = 255 255 0       </a:t>
-            </a:r>
-            <a:r>
-              <a:rPr lang="fr-FR" dirty="0" smtClean="0">
-                <a:latin typeface="Comic Sans MS" panose="030F0702030302020204" pitchFamily="66" charset="0"/>
-              </a:rPr>
-              <a:t>(cyan)</a:t>
-            </a:r>
-            <a:endParaRPr lang="fr-FR" dirty="0" smtClean="0">
-              <a:latin typeface="Comic Sans MS" panose="030F0702030302020204" pitchFamily="66" charset="0"/>
-            </a:endParaRPr>
+              <a:t> = 255 255 0       (cyan)</a:t>
+            </a:r>
           </a:p>
           <a:p>
             <a:r>
@@ -33072,11 +32850,6 @@
                 </a:rPr>
                 <a:t>: </a:t>
               </a:r>
-              <a:endParaRPr lang="fr-FR" sz="1400" dirty="0" smtClean="0">
-                <a:solidFill>
-                  <a:schemeClr val="tx1"/>
-                </a:solidFill>
-              </a:endParaRPr>
             </a:p>
             <a:p>
               <a:pPr marL="285750" indent="-285750">
@@ -33089,23 +32862,7 @@
                     <a:schemeClr val="tx1"/>
                   </a:solidFill>
                 </a:rPr>
-                <a:t>descente </a:t>
-              </a:r>
-              <a:r>
-                <a:rPr lang="fr-FR" sz="1400" dirty="0" smtClean="0">
-                  <a:solidFill>
-                    <a:schemeClr val="tx1"/>
-                  </a:solidFill>
-                </a:rPr>
-                <a:t>de </a:t>
-              </a:r>
-              <a:r>
-                <a:rPr lang="fr-FR" sz="1400" dirty="0" smtClean="0">
-                  <a:solidFill>
-                    <a:schemeClr val="tx1"/>
-                  </a:solidFill>
-                </a:rPr>
-                <a:t>gradient</a:t>
+                <a:t>descente de gradient</a:t>
               </a:r>
             </a:p>
             <a:p>

</xml_diff>